<commit_message>
將training doc用成dict型態，dict key為class, dict value為所屬該class的所有doc和它的tokens（也是dict型態）
</commit_message>
<xml_diff>
--- a/HW3/PA-3/PA-3.pptx
+++ b/HW3/PA-3/PA-3.pptx
@@ -1413,7 +1413,7 @@
                 <a:ea typeface="新細明體" pitchFamily="18" charset="-120"/>
                 <a:cs typeface="+mn-cs"/>
               </a:rPr>
-              <a:t>doc</a:t>
+              <a:t>doc(13*15=195)</a:t>
             </a:r>
             <a:r>
               <a:rPr kumimoji="1" lang="zh-CN" altLang="en-US" sz="1400" b="0" i="0" kern="1200" dirty="0">
@@ -8042,7 +8042,7 @@
           <a:graphicData uri="http://schemas.openxmlformats.org/presentationml/2006/ole">
             <mc:AlternateContent xmlns:mc="http://schemas.openxmlformats.org/markup-compatibility/2006">
               <mc:Choice xmlns:v="urn:schemas-microsoft-com:vml" Requires="v">
-                <p:oleObj spid="_x0000_s1044" name="方程式" r:id="rId3" imgW="2908080" imgH="482400" progId="Equation.3">
+                <p:oleObj spid="_x0000_s1045" name="方程式" r:id="rId3" imgW="2908080" imgH="482400" progId="Equation.3">
                   <p:embed/>
                 </p:oleObj>
               </mc:Choice>

</xml_diff>